<commit_message>
Quarterly refresh of content
- validate lab works & screenshots correct
- minor updates where typos were found and things changed between refreshes
</commit_message>
<xml_diff>
--- a/ConnectorActionableMsgs/02 Cards and Actions/01 Card Design and MessageCard Playground.pptx
+++ b/ConnectorActionableMsgs/02 Cards and Actions/01 Card Design and MessageCard Playground.pptx
@@ -265,7 +265,7 @@
               <a:rPr lang="en-US" smtClean="0">
                 <a:latin typeface="Segoe UI" pitchFamily="34" charset="0"/>
               </a:rPr>
-              <a:t>10/25/2017 8:51 AM</a:t>
+              <a:t>9/11/2018 7:30 AM</a:t>
             </a:fld>
             <a:endParaRPr lang="en-US" dirty="0">
               <a:latin typeface="Segoe UI" pitchFamily="34" charset="0"/>
@@ -559,7 +559,7 @@
           <a:p>
             <a:fld id="{D18B56EA-E28F-4F92-9F16-7A6F2501B303}" type="datetime8">
               <a:rPr lang="en-US" smtClean="0"/>
-              <a:t>10/25/2017 8:41 AM</a:t>
+              <a:t>9/11/2018 7:29 AM</a:t>
             </a:fld>
             <a:endParaRPr lang="en-US" dirty="0"/>
           </a:p>
@@ -942,7 +942,7 @@
           <a:p>
             <a:fld id="{D18B56EA-E28F-4F92-9F16-7A6F2501B303}" type="datetime8">
               <a:rPr lang="en-US" smtClean="0"/>
-              <a:t>10/25/2017 8:41 AM</a:t>
+              <a:t>9/11/2018 7:29 AM</a:t>
             </a:fld>
             <a:endParaRPr lang="en-US" dirty="0"/>
           </a:p>
@@ -1123,7 +1123,7 @@
           <a:p>
             <a:fld id="{D18B56EA-E28F-4F92-9F16-7A6F2501B303}" type="datetime8">
               <a:rPr lang="en-US" smtClean="0"/>
-              <a:t>10/25/2017 8:41 AM</a:t>
+              <a:t>9/11/2018 7:29 AM</a:t>
             </a:fld>
             <a:endParaRPr lang="en-US" dirty="0"/>
           </a:p>
@@ -1304,7 +1304,7 @@
           <a:p>
             <a:fld id="{D18B56EA-E28F-4F92-9F16-7A6F2501B303}" type="datetime8">
               <a:rPr lang="en-US" smtClean="0"/>
-              <a:t>10/25/2017 8:41 AM</a:t>
+              <a:t>9/11/2018 7:29 AM</a:t>
             </a:fld>
             <a:endParaRPr lang="en-US" dirty="0"/>
           </a:p>
@@ -1590,7 +1590,7 @@
                 <a:tabLst/>
                 <a:defRPr/>
               </a:pPr>
-              <a:t>10/25/2017 8:41 AM</a:t>
+              <a:t>9/11/2018 7:29 AM</a:t>
             </a:fld>
             <a:endParaRPr kumimoji="0" lang="en-US" sz="1200" b="0" i="0" u="none" strike="noStrike" kern="1200" cap="none" spc="0" normalizeH="0" baseline="0" noProof="0" dirty="0">
               <a:ln>
@@ -1854,7 +1854,7 @@
           <a:p>
             <a:fld id="{D18B56EA-E28F-4F92-9F16-7A6F2501B303}" type="datetime8">
               <a:rPr lang="en-US" smtClean="0"/>
-              <a:t>10/25/2017 8:41 AM</a:t>
+              <a:t>9/11/2018 7:29 AM</a:t>
             </a:fld>
             <a:endParaRPr lang="en-US" dirty="0"/>
           </a:p>
@@ -2055,7 +2055,7 @@
           <a:p>
             <a:fld id="{D18B56EA-E28F-4F92-9F16-7A6F2501B303}" type="datetime8">
               <a:rPr lang="en-US" smtClean="0"/>
-              <a:t>10/25/2017 8:41 AM</a:t>
+              <a:t>9/11/2018 7:29 AM</a:t>
             </a:fld>
             <a:endParaRPr lang="en-US" dirty="0"/>
           </a:p>
@@ -2239,7 +2239,7 @@
           <a:p>
             <a:fld id="{D18B56EA-E28F-4F92-9F16-7A6F2501B303}" type="datetime8">
               <a:rPr lang="en-US" smtClean="0"/>
-              <a:t>10/25/2017 8:41 AM</a:t>
+              <a:t>9/11/2018 7:29 AM</a:t>
             </a:fld>
             <a:endParaRPr lang="en-US" dirty="0"/>
           </a:p>
@@ -2442,7 +2442,7 @@
           <a:p>
             <a:fld id="{D18B56EA-E28F-4F92-9F16-7A6F2501B303}" type="datetime8">
               <a:rPr lang="en-US" smtClean="0"/>
-              <a:t>10/25/2017 8:41 AM</a:t>
+              <a:t>9/11/2018 7:29 AM</a:t>
             </a:fld>
             <a:endParaRPr lang="en-US" dirty="0"/>
           </a:p>
@@ -2783,7 +2783,7 @@
           <a:p>
             <a:fld id="{D18B56EA-E28F-4F92-9F16-7A6F2501B303}" type="datetime8">
               <a:rPr lang="en-US" smtClean="0"/>
-              <a:t>10/25/2017 8:41 AM</a:t>
+              <a:t>9/11/2018 7:29 AM</a:t>
             </a:fld>
             <a:endParaRPr lang="en-US" dirty="0"/>
           </a:p>
@@ -2976,7 +2976,7 @@
           <a:p>
             <a:fld id="{D18B56EA-E28F-4F92-9F16-7A6F2501B303}" type="datetime8">
               <a:rPr lang="en-US" smtClean="0"/>
-              <a:t>10/25/2017 8:41 AM</a:t>
+              <a:t>9/11/2018 7:29 AM</a:t>
             </a:fld>
             <a:endParaRPr lang="en-US" dirty="0"/>
           </a:p>
@@ -3157,7 +3157,7 @@
           <a:p>
             <a:fld id="{D18B56EA-E28F-4F92-9F16-7A6F2501B303}" type="datetime8">
               <a:rPr lang="en-US" smtClean="0"/>
-              <a:t>10/25/2017 8:41 AM</a:t>
+              <a:t>9/11/2018 7:29 AM</a:t>
             </a:fld>
             <a:endParaRPr lang="en-US" dirty="0"/>
           </a:p>
@@ -17000,13 +17000,13 @@
         </p:nvPicPr>
         <p:blipFill rotWithShape="1">
           <a:blip r:embed="rId4"/>
-          <a:srcRect b="3177"/>
+          <a:srcRect t="8734" b="3177"/>
           <a:stretch/>
         </p:blipFill>
         <p:spPr>
           <a:xfrm>
-            <a:off x="1935480" y="1553203"/>
-            <a:ext cx="8534400" cy="4818059"/>
+            <a:off x="1976533" y="1604495"/>
+            <a:ext cx="8428726" cy="4329160"/>
           </a:xfrm>
           <a:prstGeom prst="rect">
             <a:avLst/>
@@ -17030,7 +17030,7 @@
         </p:nvSpPr>
         <p:spPr bwMode="auto">
           <a:xfrm>
-            <a:off x="1935481" y="5532699"/>
+            <a:off x="1935481" y="5714618"/>
             <a:ext cx="8534400" cy="625033"/>
           </a:xfrm>
           <a:prstGeom prst="rect">
@@ -17141,7 +17141,7 @@
         </p:nvSpPr>
         <p:spPr>
           <a:xfrm>
-            <a:off x="3566543" y="5660549"/>
+            <a:off x="3554757" y="5830101"/>
             <a:ext cx="5272277" cy="369332"/>
           </a:xfrm>
           <a:prstGeom prst="rect">

</xml_diff>